<commit_message>
Added READMEs, binaries, updated repo, fixed APDU bug
Should be final commit. READMEs are written, binaries distributed and
overall things are working as they should be.
</commit_message>
<xml_diff>
--- a/docs/ST_project.pptx
+++ b/docs/ST_project.pptx
@@ -3553,7 +3553,7 @@
     </p:spTree>
     <p:extLst>
       <p:ext uri="{BB962C8B-B14F-4D97-AF65-F5344CB8AC3E}">
-        <p14:creationId xmlns:p14="http://schemas.microsoft.com/office/powerpoint/2010/main" xmlns="" val="3157522590"/>
+        <p14:creationId xmlns="" xmlns:p14="http://schemas.microsoft.com/office/powerpoint/2010/main" val="3157522590"/>
       </p:ext>
     </p:extLst>
   </p:cSld>
@@ -3639,11 +3639,7 @@
             </a:pPr>
             <a:r>
               <a:rPr lang="ca-ES" dirty="0" smtClean="0"/>
-              <a:t>Allow to </a:t>
-            </a:r>
-            <a:r>
-              <a:rPr lang="ca-ES" dirty="0" smtClean="0"/>
-              <a:t>en</a:t>
+              <a:t>Allow to en</a:t>
             </a:r>
             <a:r>
               <a:rPr lang="sk-SK" dirty="0" smtClean="0"/>
@@ -3651,12 +3647,21 @@
             </a:r>
             <a:r>
               <a:rPr lang="ca-ES" dirty="0" smtClean="0"/>
-              <a:t>rypt </a:t>
-            </a:r>
-            <a:r>
-              <a:rPr lang="ca-ES" dirty="0" smtClean="0"/>
-              <a:t>and decrypt files using key from Javacard</a:t>
-            </a:r>
+              <a:t>rypt and decrypt files using key from </a:t>
+            </a:r>
+            <a:r>
+              <a:rPr lang="ca-ES" dirty="0" smtClean="0"/>
+              <a:t>Javacard</a:t>
+            </a:r>
+            <a:r>
+              <a:rPr lang="sk-SK" dirty="0" smtClean="0"/>
+              <a:t> </a:t>
+            </a:r>
+            <a:r>
+              <a:rPr lang="en-US" smtClean="0"/>
+              <a:t>(communication via PC/SC)</a:t>
+            </a:r>
+            <a:endParaRPr lang="ca-ES" dirty="0" smtClean="0"/>
           </a:p>
           <a:p>
             <a:pPr marL="342900" indent="-342900">
@@ -3667,7 +3672,6 @@
               <a:rPr lang="ca-ES" dirty="0" smtClean="0"/>
               <a:t>Key is derived from master key (stored in card) and a counter (stored in the filename of the file) </a:t>
             </a:r>
-            <a:endParaRPr lang="ca-ES" dirty="0" smtClean="0"/>
           </a:p>
           <a:p>
             <a:pPr marL="342900" indent="-342900">
@@ -3678,7 +3682,6 @@
               <a:rPr lang="ca-ES" dirty="0" smtClean="0"/>
               <a:t>Each file is encrypted with unique password</a:t>
             </a:r>
-            <a:endParaRPr lang="ca-ES" dirty="0" smtClean="0"/>
           </a:p>
           <a:p>
             <a:pPr marL="342900" indent="-342900">
@@ -3732,13 +3735,8 @@
             </a:pPr>
             <a:r>
               <a:rPr lang="ca-ES" dirty="0" smtClean="0"/>
-              <a:t>Easy </a:t>
-            </a:r>
-            <a:r>
-              <a:rPr lang="ca-ES" dirty="0" smtClean="0"/>
-              <a:t>passwords</a:t>
-            </a:r>
-            <a:endParaRPr lang="ca-ES" dirty="0" smtClean="0"/>
+              <a:t>Easy passwords</a:t>
+            </a:r>
           </a:p>
           <a:p>
             <a:pPr lvl="1" indent="0">
@@ -3772,7 +3770,7 @@
     </p:spTree>
     <p:extLst>
       <p:ext uri="{BB962C8B-B14F-4D97-AF65-F5344CB8AC3E}">
-        <p14:creationId xmlns:p14="http://schemas.microsoft.com/office/powerpoint/2010/main" xmlns="" val="2843170696"/>
+        <p14:creationId xmlns="" xmlns:p14="http://schemas.microsoft.com/office/powerpoint/2010/main" val="2843170696"/>
       </p:ext>
     </p:extLst>
   </p:cSld>
@@ -3904,7 +3902,7 @@
     </p:spTree>
     <p:extLst>
       <p:ext uri="{BB962C8B-B14F-4D97-AF65-F5344CB8AC3E}">
-        <p14:creationId xmlns:p14="http://schemas.microsoft.com/office/powerpoint/2010/main" xmlns="" val="1263573877"/>
+        <p14:creationId xmlns="" xmlns:p14="http://schemas.microsoft.com/office/powerpoint/2010/main" val="1263573877"/>
       </p:ext>
     </p:extLst>
   </p:cSld>
@@ -4036,7 +4034,7 @@
     </p:spTree>
     <p:extLst>
       <p:ext uri="{BB962C8B-B14F-4D97-AF65-F5344CB8AC3E}">
-        <p14:creationId xmlns:p14="http://schemas.microsoft.com/office/powerpoint/2010/main" xmlns="" val="3162330216"/>
+        <p14:creationId xmlns="" xmlns:p14="http://schemas.microsoft.com/office/powerpoint/2010/main" val="3162330216"/>
       </p:ext>
     </p:extLst>
   </p:cSld>
@@ -4122,7 +4120,7 @@
     </p:spTree>
     <p:extLst>
       <p:ext uri="{BB962C8B-B14F-4D97-AF65-F5344CB8AC3E}">
-        <p14:creationId xmlns:p14="http://schemas.microsoft.com/office/powerpoint/2010/main" xmlns="" val="1327603662"/>
+        <p14:creationId xmlns="" xmlns:p14="http://schemas.microsoft.com/office/powerpoint/2010/main" val="1327603662"/>
       </p:ext>
     </p:extLst>
   </p:cSld>
@@ -4231,11 +4229,7 @@
             </a:r>
             <a:r>
               <a:rPr lang="ca-ES" dirty="0" smtClean="0"/>
-              <a:t>C </a:t>
-            </a:r>
-            <a:r>
-              <a:rPr lang="ca-ES" dirty="0" smtClean="0"/>
-              <a:t>and ASM code</a:t>
+              <a:t>C and ASM code</a:t>
             </a:r>
           </a:p>
           <a:p>
@@ -4463,19 +4457,7 @@
             </a:pPr>
             <a:r>
               <a:rPr lang="ca-ES" dirty="0" smtClean="0"/>
-              <a:t>Hopefully </a:t>
-            </a:r>
-            <a:r>
-              <a:rPr lang="ca-ES" dirty="0" smtClean="0"/>
-              <a:t>cloning </a:t>
-            </a:r>
-            <a:r>
-              <a:rPr lang="ca-ES" dirty="0" smtClean="0"/>
-              <a:t>our repository will be </a:t>
-            </a:r>
-            <a:r>
-              <a:rPr lang="ca-ES" dirty="0" smtClean="0"/>
-              <a:t>enough (build for MSVC2015)</a:t>
+              <a:t>Hopefully cloning our repository will be enough (build for MSVC2015)</a:t>
             </a:r>
             <a:endParaRPr lang="ca-ES" dirty="0"/>
           </a:p>
@@ -4555,11 +4537,7 @@
             </a:pPr>
             <a:r>
               <a:rPr lang="ca-ES" dirty="0" smtClean="0"/>
-              <a:t>Many executables and our projects aren’t 100% correctly </a:t>
-            </a:r>
-            <a:r>
-              <a:rPr lang="ca-ES" dirty="0" smtClean="0"/>
-              <a:t>configured</a:t>
+              <a:t>Many executables and our projects aren’t 100% correctly configured</a:t>
             </a:r>
             <a:endParaRPr lang="sk-SK" dirty="0" smtClean="0"/>
           </a:p>
@@ -4579,7 +4557,7 @@
     </p:spTree>
     <p:extLst>
       <p:ext uri="{BB962C8B-B14F-4D97-AF65-F5344CB8AC3E}">
-        <p14:creationId xmlns:p14="http://schemas.microsoft.com/office/powerpoint/2010/main" xmlns="" val="4205670871"/>
+        <p14:creationId xmlns="" xmlns:p14="http://schemas.microsoft.com/office/powerpoint/2010/main" val="4205670871"/>
       </p:ext>
     </p:extLst>
   </p:cSld>
@@ -4692,13 +4670,8 @@
             </a:pPr>
             <a:r>
               <a:rPr lang="ca-ES" dirty="0" smtClean="0"/>
-              <a:t>C++ Interface with </a:t>
-            </a:r>
-            <a:r>
-              <a:rPr lang="ca-ES" dirty="0" smtClean="0"/>
-              <a:t>card</a:t>
-            </a:r>
-            <a:endParaRPr lang="ca-ES" dirty="0" smtClean="0"/>
+              <a:t>C++ Interface with card</a:t>
+            </a:r>
           </a:p>
           <a:p>
             <a:pPr marL="800100" lvl="1" indent="-342900">
@@ -4772,11 +4745,7 @@
             </a:pPr>
             <a:r>
               <a:rPr lang="ca-ES" dirty="0" smtClean="0"/>
-              <a:t>Basically in onOk</a:t>
-            </a:r>
-            <a:r>
-              <a:rPr lang="ca-ES" dirty="0" smtClean="0"/>
-              <a:t>()</a:t>
+              <a:t>Basically in onOk()</a:t>
             </a:r>
           </a:p>
           <a:p>
@@ -4788,7 +4757,6 @@
               <a:rPr lang="ca-ES" dirty="0" smtClean="0"/>
               <a:t>Sets password from the card</a:t>
             </a:r>
-            <a:endParaRPr lang="ca-ES" dirty="0" smtClean="0"/>
           </a:p>
           <a:p>
             <a:pPr marL="800100" lvl="1" indent="-342900">
@@ -4892,7 +4860,7 @@
     </p:spTree>
     <p:extLst>
       <p:ext uri="{BB962C8B-B14F-4D97-AF65-F5344CB8AC3E}">
-        <p14:creationId xmlns:p14="http://schemas.microsoft.com/office/powerpoint/2010/main" xmlns="" val="2322314081"/>
+        <p14:creationId xmlns="" xmlns:p14="http://schemas.microsoft.com/office/powerpoint/2010/main" val="2322314081"/>
       </p:ext>
     </p:extLst>
   </p:cSld>
@@ -4991,7 +4959,6 @@
               <a:rPr lang="hr-HR" dirty="0" smtClean="0"/>
               <a:t>Javacard/AppletTester/src/applet/Applet7Zip.java</a:t>
             </a:r>
-            <a:endParaRPr lang="hr-HR" dirty="0" smtClean="0"/>
           </a:p>
           <a:p>
             <a:pPr marL="342900" indent="-342900">
@@ -5178,7 +5145,7 @@
     </p:spTree>
     <p:extLst>
       <p:ext uri="{BB962C8B-B14F-4D97-AF65-F5344CB8AC3E}">
-        <p14:creationId xmlns:p14="http://schemas.microsoft.com/office/powerpoint/2010/main" xmlns="" val="3091779507"/>
+        <p14:creationId xmlns="" xmlns:p14="http://schemas.microsoft.com/office/powerpoint/2010/main" val="3091779507"/>
       </p:ext>
     </p:extLst>
   </p:cSld>

</xml_diff>